<commit_message>
correção de erro ortográfico
</commit_message>
<xml_diff>
--- a/documentos/Apresentação.pptx
+++ b/documentos/Apresentação.pptx
@@ -260,7 +260,7 @@
           <a:p>
             <a:fld id="{D93ACE01-AFDD-4EB6-97C9-3A2749F6FB36}" type="datetimeFigureOut">
               <a:rPr lang="pt-BR" smtClean="0"/>
-              <a:t>03/03/2021</a:t>
+              <a:t>04/03/2021</a:t>
             </a:fld>
             <a:endParaRPr lang="pt-BR"/>
           </a:p>
@@ -458,7 +458,7 @@
           <a:p>
             <a:fld id="{D93ACE01-AFDD-4EB6-97C9-3A2749F6FB36}" type="datetimeFigureOut">
               <a:rPr lang="pt-BR" smtClean="0"/>
-              <a:t>03/03/2021</a:t>
+              <a:t>04/03/2021</a:t>
             </a:fld>
             <a:endParaRPr lang="pt-BR"/>
           </a:p>
@@ -666,7 +666,7 @@
           <a:p>
             <a:fld id="{D93ACE01-AFDD-4EB6-97C9-3A2749F6FB36}" type="datetimeFigureOut">
               <a:rPr lang="pt-BR" smtClean="0"/>
-              <a:t>03/03/2021</a:t>
+              <a:t>04/03/2021</a:t>
             </a:fld>
             <a:endParaRPr lang="pt-BR"/>
           </a:p>
@@ -864,7 +864,7 @@
           <a:p>
             <a:fld id="{D93ACE01-AFDD-4EB6-97C9-3A2749F6FB36}" type="datetimeFigureOut">
               <a:rPr lang="pt-BR" smtClean="0"/>
-              <a:t>03/03/2021</a:t>
+              <a:t>04/03/2021</a:t>
             </a:fld>
             <a:endParaRPr lang="pt-BR"/>
           </a:p>
@@ -1139,7 +1139,7 @@
           <a:p>
             <a:fld id="{D93ACE01-AFDD-4EB6-97C9-3A2749F6FB36}" type="datetimeFigureOut">
               <a:rPr lang="pt-BR" smtClean="0"/>
-              <a:t>03/03/2021</a:t>
+              <a:t>04/03/2021</a:t>
             </a:fld>
             <a:endParaRPr lang="pt-BR"/>
           </a:p>
@@ -1404,7 +1404,7 @@
           <a:p>
             <a:fld id="{D93ACE01-AFDD-4EB6-97C9-3A2749F6FB36}" type="datetimeFigureOut">
               <a:rPr lang="pt-BR" smtClean="0"/>
-              <a:t>03/03/2021</a:t>
+              <a:t>04/03/2021</a:t>
             </a:fld>
             <a:endParaRPr lang="pt-BR"/>
           </a:p>
@@ -1816,7 +1816,7 @@
           <a:p>
             <a:fld id="{D93ACE01-AFDD-4EB6-97C9-3A2749F6FB36}" type="datetimeFigureOut">
               <a:rPr lang="pt-BR" smtClean="0"/>
-              <a:t>03/03/2021</a:t>
+              <a:t>04/03/2021</a:t>
             </a:fld>
             <a:endParaRPr lang="pt-BR"/>
           </a:p>
@@ -1957,7 +1957,7 @@
           <a:p>
             <a:fld id="{D93ACE01-AFDD-4EB6-97C9-3A2749F6FB36}" type="datetimeFigureOut">
               <a:rPr lang="pt-BR" smtClean="0"/>
-              <a:t>03/03/2021</a:t>
+              <a:t>04/03/2021</a:t>
             </a:fld>
             <a:endParaRPr lang="pt-BR"/>
           </a:p>
@@ -2070,7 +2070,7 @@
           <a:p>
             <a:fld id="{D93ACE01-AFDD-4EB6-97C9-3A2749F6FB36}" type="datetimeFigureOut">
               <a:rPr lang="pt-BR" smtClean="0"/>
-              <a:t>03/03/2021</a:t>
+              <a:t>04/03/2021</a:t>
             </a:fld>
             <a:endParaRPr lang="pt-BR"/>
           </a:p>
@@ -2381,7 +2381,7 @@
           <a:p>
             <a:fld id="{D93ACE01-AFDD-4EB6-97C9-3A2749F6FB36}" type="datetimeFigureOut">
               <a:rPr lang="pt-BR" smtClean="0"/>
-              <a:t>03/03/2021</a:t>
+              <a:t>04/03/2021</a:t>
             </a:fld>
             <a:endParaRPr lang="pt-BR"/>
           </a:p>
@@ -2669,7 +2669,7 @@
           <a:p>
             <a:fld id="{D93ACE01-AFDD-4EB6-97C9-3A2749F6FB36}" type="datetimeFigureOut">
               <a:rPr lang="pt-BR" smtClean="0"/>
-              <a:t>03/03/2021</a:t>
+              <a:t>04/03/2021</a:t>
             </a:fld>
             <a:endParaRPr lang="pt-BR"/>
           </a:p>
@@ -2910,7 +2910,7 @@
           <a:p>
             <a:fld id="{D93ACE01-AFDD-4EB6-97C9-3A2749F6FB36}" type="datetimeFigureOut">
               <a:rPr lang="pt-BR" smtClean="0"/>
-              <a:t>03/03/2021</a:t>
+              <a:t>04/03/2021</a:t>
             </a:fld>
             <a:endParaRPr lang="pt-BR"/>
           </a:p>
@@ -4519,7 +4519,7 @@
                 </a:effectLst>
                 <a:latin typeface="Exo 2" panose="00000800000000000000" pitchFamily="50" charset="0"/>
               </a:rPr>
-              <a:t>Jorna de trabalho excessiva</a:t>
+              <a:t>Jornada de trabalho excessiva</a:t>
             </a:r>
           </a:p>
         </p:txBody>

</xml_diff>